<commit_message>
update to boarding pass recognizer custom model
</commit_message>
<xml_diff>
--- a/avkash-project/Udacity-Design.pptx
+++ b/avkash-project/Udacity-Design.pptx
@@ -107,6 +107,11 @@
       </a:defRPr>
     </a:lvl9pPr>
   </p:defaultTextStyle>
+  <p:extLst>
+    <p:ext uri="{EFAFB233-063F-42B5-8137-9DF3F51BA10A}">
+      <p15:sldGuideLst xmlns:p15="http://schemas.microsoft.com/office/powerpoint/2012/main"/>
+    </p:ext>
+  </p:extLst>
 </p:presentation>
 </file>
 
@@ -6767,6 +6772,96 @@
           </a:extLst>
         </p:spPr>
       </p:pic>
+      <p:pic>
+        <p:nvPicPr>
+          <p:cNvPr id="3" name="Picture 2" descr="ML Pipelines in Azure Machine Learning the right way | by Coussement Bruno  | datamindedbe | Jun, 2021 | Medium">
+            <a:extLst>
+              <a:ext uri="{FF2B5EF4-FFF2-40B4-BE49-F238E27FC236}">
+                <a16:creationId xmlns:a16="http://schemas.microsoft.com/office/drawing/2014/main" id="{EAAC580A-223C-6144-A0BB-89EEADD37DE5}"/>
+              </a:ext>
+            </a:extLst>
+          </p:cNvPr>
+          <p:cNvPicPr>
+            <a:picLocks noChangeAspect="1" noChangeArrowheads="1"/>
+          </p:cNvPicPr>
+          <p:nvPr/>
+        </p:nvPicPr>
+        <p:blipFill>
+          <a:blip r:embed="rId7">
+            <a:extLst>
+              <a:ext uri="{28A0092B-C50C-407E-A947-70E740481C1C}">
+                <a14:useLocalDpi xmlns:a14="http://schemas.microsoft.com/office/drawing/2010/main" val="0"/>
+              </a:ext>
+            </a:extLst>
+          </a:blip>
+          <a:srcRect/>
+          <a:stretch>
+            <a:fillRect/>
+          </a:stretch>
+        </p:blipFill>
+        <p:spPr bwMode="auto">
+          <a:xfrm>
+            <a:off x="8855346" y="2709760"/>
+            <a:ext cx="579672" cy="623727"/>
+          </a:xfrm>
+          <a:prstGeom prst="rect">
+            <a:avLst/>
+          </a:prstGeom>
+          <a:noFill/>
+          <a:extLst>
+            <a:ext uri="{909E8E84-426E-40DD-AFC4-6F175D3DCCD1}">
+              <a14:hiddenFill xmlns:a14="http://schemas.microsoft.com/office/drawing/2010/main">
+                <a:solidFill>
+                  <a:srgbClr val="FFFFFF"/>
+                </a:solidFill>
+              </a14:hiddenFill>
+            </a:ext>
+          </a:extLst>
+        </p:spPr>
+      </p:pic>
+      <p:sp>
+        <p:nvSpPr>
+          <p:cNvPr id="13" name="TextBox 12">
+            <a:extLst>
+              <a:ext uri="{FF2B5EF4-FFF2-40B4-BE49-F238E27FC236}">
+                <a16:creationId xmlns:a16="http://schemas.microsoft.com/office/drawing/2014/main" id="{D51FA9D6-C475-5344-A233-D444121FD28B}"/>
+              </a:ext>
+            </a:extLst>
+          </p:cNvPr>
+          <p:cNvSpPr txBox="1"/>
+          <p:nvPr/>
+        </p:nvSpPr>
+        <p:spPr>
+          <a:xfrm>
+            <a:off x="8758505" y="3331235"/>
+            <a:ext cx="773352" cy="461665"/>
+          </a:xfrm>
+          <a:prstGeom prst="rect">
+            <a:avLst/>
+          </a:prstGeom>
+          <a:noFill/>
+        </p:spPr>
+        <p:txBody>
+          <a:bodyPr wrap="none" rtlCol="0">
+            <a:spAutoFit/>
+          </a:bodyPr>
+          <a:lstStyle/>
+          <a:p>
+            <a:pPr algn="ctr"/>
+            <a:r>
+              <a:rPr lang="en-US" sz="1200" dirty="0"/>
+              <a:t>Azure ML</a:t>
+            </a:r>
+          </a:p>
+          <a:p>
+            <a:pPr algn="ctr"/>
+            <a:r>
+              <a:rPr lang="en-US" sz="1200" dirty="0"/>
+              <a:t>Studio</a:t>
+            </a:r>
+          </a:p>
+        </p:txBody>
+      </p:sp>
     </p:spTree>
     <p:extLst>
       <p:ext uri="{BB962C8B-B14F-4D97-AF65-F5344CB8AC3E}">

</xml_diff>

<commit_message>
update to design doc and lighter images
</commit_message>
<xml_diff>
--- a/avkash-project/Udacity-Design.pptx
+++ b/avkash-project/Udacity-Design.pptx
@@ -8,9 +8,11 @@
     <p:sldId id="256" r:id="rId2"/>
     <p:sldId id="257" r:id="rId3"/>
     <p:sldId id="260" r:id="rId4"/>
-    <p:sldId id="262" r:id="rId5"/>
-    <p:sldId id="258" r:id="rId6"/>
-    <p:sldId id="259" r:id="rId7"/>
+    <p:sldId id="263" r:id="rId5"/>
+    <p:sldId id="262" r:id="rId6"/>
+    <p:sldId id="258" r:id="rId7"/>
+    <p:sldId id="259" r:id="rId8"/>
+    <p:sldId id="264" r:id="rId9"/>
   </p:sldIdLst>
   <p:sldSz cx="12192000" cy="6858000"/>
   <p:notesSz cx="6858000" cy="9144000"/>
@@ -264,7 +266,7 @@
           <a:p>
             <a:fld id="{E198D237-F090-9C44-A0A7-0E393A804467}" type="datetimeFigureOut">
               <a:rPr lang="en-US" smtClean="0"/>
-              <a:t>6/25/21</a:t>
+              <a:t>7/8/21</a:t>
             </a:fld>
             <a:endParaRPr lang="en-US"/>
           </a:p>
@@ -462,7 +464,7 @@
           <a:p>
             <a:fld id="{E198D237-F090-9C44-A0A7-0E393A804467}" type="datetimeFigureOut">
               <a:rPr lang="en-US" smtClean="0"/>
-              <a:t>6/25/21</a:t>
+              <a:t>7/8/21</a:t>
             </a:fld>
             <a:endParaRPr lang="en-US"/>
           </a:p>
@@ -670,7 +672,7 @@
           <a:p>
             <a:fld id="{E198D237-F090-9C44-A0A7-0E393A804467}" type="datetimeFigureOut">
               <a:rPr lang="en-US" smtClean="0"/>
-              <a:t>6/25/21</a:t>
+              <a:t>7/8/21</a:t>
             </a:fld>
             <a:endParaRPr lang="en-US"/>
           </a:p>
@@ -868,7 +870,7 @@
           <a:p>
             <a:fld id="{E198D237-F090-9C44-A0A7-0E393A804467}" type="datetimeFigureOut">
               <a:rPr lang="en-US" smtClean="0"/>
-              <a:t>6/25/21</a:t>
+              <a:t>7/8/21</a:t>
             </a:fld>
             <a:endParaRPr lang="en-US"/>
           </a:p>
@@ -1143,7 +1145,7 @@
           <a:p>
             <a:fld id="{E198D237-F090-9C44-A0A7-0E393A804467}" type="datetimeFigureOut">
               <a:rPr lang="en-US" smtClean="0"/>
-              <a:t>6/25/21</a:t>
+              <a:t>7/8/21</a:t>
             </a:fld>
             <a:endParaRPr lang="en-US"/>
           </a:p>
@@ -1408,7 +1410,7 @@
           <a:p>
             <a:fld id="{E198D237-F090-9C44-A0A7-0E393A804467}" type="datetimeFigureOut">
               <a:rPr lang="en-US" smtClean="0"/>
-              <a:t>6/25/21</a:t>
+              <a:t>7/8/21</a:t>
             </a:fld>
             <a:endParaRPr lang="en-US"/>
           </a:p>
@@ -1820,7 +1822,7 @@
           <a:p>
             <a:fld id="{E198D237-F090-9C44-A0A7-0E393A804467}" type="datetimeFigureOut">
               <a:rPr lang="en-US" smtClean="0"/>
-              <a:t>6/25/21</a:t>
+              <a:t>7/8/21</a:t>
             </a:fld>
             <a:endParaRPr lang="en-US"/>
           </a:p>
@@ -1961,7 +1963,7 @@
           <a:p>
             <a:fld id="{E198D237-F090-9C44-A0A7-0E393A804467}" type="datetimeFigureOut">
               <a:rPr lang="en-US" smtClean="0"/>
-              <a:t>6/25/21</a:t>
+              <a:t>7/8/21</a:t>
             </a:fld>
             <a:endParaRPr lang="en-US"/>
           </a:p>
@@ -2074,7 +2076,7 @@
           <a:p>
             <a:fld id="{E198D237-F090-9C44-A0A7-0E393A804467}" type="datetimeFigureOut">
               <a:rPr lang="en-US" smtClean="0"/>
-              <a:t>6/25/21</a:t>
+              <a:t>7/8/21</a:t>
             </a:fld>
             <a:endParaRPr lang="en-US"/>
           </a:p>
@@ -2385,7 +2387,7 @@
           <a:p>
             <a:fld id="{E198D237-F090-9C44-A0A7-0E393A804467}" type="datetimeFigureOut">
               <a:rPr lang="en-US" smtClean="0"/>
-              <a:t>6/25/21</a:t>
+              <a:t>7/8/21</a:t>
             </a:fld>
             <a:endParaRPr lang="en-US"/>
           </a:p>
@@ -2673,7 +2675,7 @@
           <a:p>
             <a:fld id="{E198D237-F090-9C44-A0A7-0E393A804467}" type="datetimeFigureOut">
               <a:rPr lang="en-US" smtClean="0"/>
-              <a:t>6/25/21</a:t>
+              <a:t>7/8/21</a:t>
             </a:fld>
             <a:endParaRPr lang="en-US"/>
           </a:p>
@@ -2914,7 +2916,7 @@
           <a:p>
             <a:fld id="{E198D237-F090-9C44-A0A7-0E393A804467}" type="datetimeFigureOut">
               <a:rPr lang="en-US" smtClean="0"/>
-              <a:t>6/25/21</a:t>
+              <a:t>7/8/21</a:t>
             </a:fld>
             <a:endParaRPr lang="en-US"/>
           </a:p>
@@ -4705,7 +4707,7 @@
         </p:nvGrpSpPr>
         <p:grpSpPr>
           <a:xfrm rot="10800000">
-            <a:off x="8615174" y="1462040"/>
+            <a:off x="8893120" y="1469612"/>
             <a:ext cx="393649" cy="3844052"/>
             <a:chOff x="8860079" y="1462040"/>
             <a:chExt cx="393649" cy="3844052"/>
@@ -5013,23 +5015,23 @@
             </a:extLst>
           </p:cNvPr>
           <p:cNvCxnSpPr>
+            <a:cxnSpLocks/>
             <a:stCxn id="10" idx="1"/>
-            <a:endCxn id="3" idx="2"/>
+            <a:endCxn id="3" idx="1"/>
           </p:cNvCxnSpPr>
           <p:nvPr/>
         </p:nvCxnSpPr>
         <p:spPr>
-          <a:xfrm rot="10800000" flipH="1">
-            <a:off x="3703734" y="3876950"/>
-            <a:ext cx="609186" cy="1029807"/>
-          </a:xfrm>
-          <a:prstGeom prst="bentConnector4">
+          <a:xfrm rot="10800000">
+            <a:off x="3666744" y="3470042"/>
+            <a:ext cx="36990" cy="1436715"/>
+          </a:xfrm>
+          <a:prstGeom prst="bentConnector3">
             <a:avLst>
-              <a:gd name="adj1" fmla="val -37525"/>
-              <a:gd name="adj2" fmla="val 69756"/>
+              <a:gd name="adj1" fmla="val 718005"/>
             </a:avLst>
           </a:prstGeom>
-          <a:ln>
+          <a:ln w="38100">
             <a:tailEnd type="triangle"/>
           </a:ln>
         </p:spPr>
@@ -5072,7 +5074,10 @@
           <a:prstGeom prst="bentConnector3">
             <a:avLst/>
           </a:prstGeom>
-          <a:ln>
+          <a:ln w="38100">
+            <a:solidFill>
+              <a:schemeClr val="tx1"/>
+            </a:solidFill>
             <a:tailEnd type="triangle"/>
           </a:ln>
         </p:spPr>
@@ -5115,7 +5120,10 @@
           <a:prstGeom prst="bentConnector3">
             <a:avLst/>
           </a:prstGeom>
-          <a:ln>
+          <a:ln w="38100">
+            <a:solidFill>
+              <a:schemeClr val="accent6"/>
+            </a:solidFill>
             <a:tailEnd type="triangle"/>
           </a:ln>
         </p:spPr>
@@ -5156,10 +5164,10 @@
           </a:xfrm>
           <a:prstGeom prst="bentConnector3">
             <a:avLst>
-              <a:gd name="adj1" fmla="val 50000"/>
+              <a:gd name="adj1" fmla="val 25892"/>
             </a:avLst>
           </a:prstGeom>
-          <a:ln>
+          <a:ln w="38100">
             <a:tailEnd type="triangle"/>
           </a:ln>
         </p:spPr>
@@ -5202,7 +5210,10 @@
           <a:prstGeom prst="bentConnector3">
             <a:avLst/>
           </a:prstGeom>
-          <a:ln>
+          <a:ln w="38100">
+            <a:solidFill>
+              <a:schemeClr val="tx1"/>
+            </a:solidFill>
             <a:tailEnd type="triangle"/>
           </a:ln>
         </p:spPr>
@@ -5233,21 +5244,25 @@
           <p:cNvCxnSpPr>
             <a:cxnSpLocks/>
             <a:stCxn id="12" idx="0"/>
-            <a:endCxn id="2" idx="2"/>
+            <a:endCxn id="2" idx="3"/>
           </p:cNvCxnSpPr>
           <p:nvPr/>
         </p:nvCxnSpPr>
         <p:spPr>
           <a:xfrm rot="5400000" flipH="1" flipV="1">
-            <a:off x="6552589" y="3084697"/>
-            <a:ext cx="665199" cy="2167622"/>
-          </a:xfrm>
-          <a:prstGeom prst="bentConnector3">
+            <a:off x="6634123" y="2596255"/>
+            <a:ext cx="1072107" cy="2737598"/>
+          </a:xfrm>
+          <a:prstGeom prst="bentConnector4">
             <a:avLst>
-              <a:gd name="adj1" fmla="val 50000"/>
+              <a:gd name="adj1" fmla="val 21306"/>
+              <a:gd name="adj2" fmla="val 108350"/>
             </a:avLst>
           </a:prstGeom>
-          <a:ln>
+          <a:ln w="38100">
+            <a:solidFill>
+              <a:schemeClr val="accent6"/>
+            </a:solidFill>
             <a:tailEnd type="triangle"/>
           </a:ln>
         </p:spPr>
@@ -5278,21 +5293,26 @@
           <p:cNvCxnSpPr>
             <a:cxnSpLocks/>
             <a:stCxn id="13" idx="0"/>
-            <a:endCxn id="4" idx="2"/>
+            <a:endCxn id="33" idx="2"/>
           </p:cNvCxnSpPr>
           <p:nvPr/>
         </p:nvCxnSpPr>
         <p:spPr>
           <a:xfrm rot="16200000" flipV="1">
-            <a:off x="6212421" y="3239321"/>
-            <a:ext cx="622899" cy="1898155"/>
+            <a:off x="6780662" y="3807562"/>
+            <a:ext cx="663940" cy="720631"/>
           </a:xfrm>
           <a:prstGeom prst="bentConnector3">
             <a:avLst>
               <a:gd name="adj1" fmla="val 50000"/>
             </a:avLst>
           </a:prstGeom>
-          <a:ln>
+          <a:ln w="38100">
+            <a:solidFill>
+              <a:schemeClr val="accent1">
+                <a:lumMod val="75000"/>
+              </a:schemeClr>
+            </a:solidFill>
             <a:tailEnd type="triangle"/>
           </a:ln>
         </p:spPr>
@@ -5335,7 +5355,7 @@
           <a:prstGeom prst="bentConnector3">
             <a:avLst/>
           </a:prstGeom>
-          <a:ln>
+          <a:ln w="38100">
             <a:tailEnd type="triangle"/>
           </a:ln>
         </p:spPr>
@@ -5378,7 +5398,10 @@
           <a:prstGeom prst="bentConnector3">
             <a:avLst/>
           </a:prstGeom>
-          <a:ln>
+          <a:ln w="38100">
+            <a:solidFill>
+              <a:schemeClr val="tx1"/>
+            </a:solidFill>
             <a:tailEnd type="triangle"/>
           </a:ln>
         </p:spPr>
@@ -5544,7 +5567,7 @@
         </p:nvSpPr>
         <p:spPr>
           <a:xfrm>
-            <a:off x="3576827" y="1225296"/>
+            <a:off x="3865177" y="1168831"/>
             <a:ext cx="4528418" cy="1691640"/>
           </a:xfrm>
           <a:prstGeom prst="bracePair">
@@ -5692,7 +5715,7 @@
         </p:nvSpPr>
         <p:spPr>
           <a:xfrm>
-            <a:off x="2877530" y="1708714"/>
+            <a:off x="2819791" y="1721303"/>
             <a:ext cx="597190" cy="3005804"/>
           </a:xfrm>
           <a:prstGeom prst="upDownArrow">
@@ -7731,6 +7754,288 @@
           <a:chExt cx="0" cy="0"/>
         </a:xfrm>
       </p:grpSpPr>
+      <p:grpSp>
+        <p:nvGrpSpPr>
+          <p:cNvPr id="7" name="Group 6">
+            <a:extLst>
+              <a:ext uri="{FF2B5EF4-FFF2-40B4-BE49-F238E27FC236}">
+                <a16:creationId xmlns:a16="http://schemas.microsoft.com/office/drawing/2014/main" id="{CABABDCC-48C4-0144-9A5E-4C8084389493}"/>
+              </a:ext>
+            </a:extLst>
+          </p:cNvPr>
+          <p:cNvGrpSpPr/>
+          <p:nvPr/>
+        </p:nvGrpSpPr>
+        <p:grpSpPr>
+          <a:xfrm>
+            <a:off x="597529" y="3012540"/>
+            <a:ext cx="2761306" cy="2489703"/>
+            <a:chOff x="2299580" y="2372008"/>
+            <a:chExt cx="3874883" cy="2489703"/>
+          </a:xfrm>
+        </p:grpSpPr>
+        <p:sp>
+          <p:nvSpPr>
+            <p:cNvPr id="2" name="Round Same Side Corner Rectangle 1">
+              <a:extLst>
+                <a:ext uri="{FF2B5EF4-FFF2-40B4-BE49-F238E27FC236}">
+                  <a16:creationId xmlns:a16="http://schemas.microsoft.com/office/drawing/2014/main" id="{2CCDFCB0-D67F-ED4E-8765-62CCD917DC74}"/>
+                </a:ext>
+              </a:extLst>
+            </p:cNvPr>
+            <p:cNvSpPr/>
+            <p:nvPr/>
+          </p:nvSpPr>
+          <p:spPr>
+            <a:xfrm>
+              <a:off x="2299580" y="2372008"/>
+              <a:ext cx="3874883" cy="2489703"/>
+            </a:xfrm>
+            <a:prstGeom prst="round2SameRect">
+              <a:avLst/>
+            </a:prstGeom>
+          </p:spPr>
+          <p:style>
+            <a:lnRef idx="2">
+              <a:schemeClr val="accent1">
+                <a:shade val="50000"/>
+              </a:schemeClr>
+            </a:lnRef>
+            <a:fillRef idx="1">
+              <a:schemeClr val="accent1"/>
+            </a:fillRef>
+            <a:effectRef idx="0">
+              <a:schemeClr val="accent1"/>
+            </a:effectRef>
+            <a:fontRef idx="minor">
+              <a:schemeClr val="lt1"/>
+            </a:fontRef>
+          </p:style>
+          <p:txBody>
+            <a:bodyPr rtlCol="0" anchor="ctr"/>
+            <a:lstStyle/>
+            <a:p>
+              <a:pPr algn="ctr"/>
+              <a:endParaRPr lang="en-US"/>
+            </a:p>
+          </p:txBody>
+        </p:sp>
+        <p:sp>
+          <p:nvSpPr>
+            <p:cNvPr id="3" name="Oval 2">
+              <a:extLst>
+                <a:ext uri="{FF2B5EF4-FFF2-40B4-BE49-F238E27FC236}">
+                  <a16:creationId xmlns:a16="http://schemas.microsoft.com/office/drawing/2014/main" id="{24831BC9-452A-B141-A89A-B6CED9A9D44F}"/>
+                </a:ext>
+              </a:extLst>
+            </p:cNvPr>
+            <p:cNvSpPr/>
+            <p:nvPr/>
+          </p:nvSpPr>
+          <p:spPr>
+            <a:xfrm>
+              <a:off x="3938255" y="2444435"/>
+              <a:ext cx="711663" cy="488887"/>
+            </a:xfrm>
+            <a:prstGeom prst="ellipse">
+              <a:avLst/>
+            </a:prstGeom>
+            <a:solidFill>
+              <a:schemeClr val="accent1">
+                <a:lumMod val="75000"/>
+              </a:schemeClr>
+            </a:solidFill>
+            <a:ln>
+              <a:solidFill>
+                <a:schemeClr val="accent2"/>
+              </a:solidFill>
+            </a:ln>
+          </p:spPr>
+          <p:style>
+            <a:lnRef idx="2">
+              <a:schemeClr val="accent1">
+                <a:shade val="50000"/>
+              </a:schemeClr>
+            </a:lnRef>
+            <a:fillRef idx="1">
+              <a:schemeClr val="accent1"/>
+            </a:fillRef>
+            <a:effectRef idx="0">
+              <a:schemeClr val="accent1"/>
+            </a:effectRef>
+            <a:fontRef idx="minor">
+              <a:schemeClr val="lt1"/>
+            </a:fontRef>
+          </p:style>
+          <p:txBody>
+            <a:bodyPr rtlCol="0" anchor="ctr"/>
+            <a:lstStyle/>
+            <a:p>
+              <a:pPr algn="ctr"/>
+              <a:endParaRPr lang="en-US"/>
+            </a:p>
+          </p:txBody>
+        </p:sp>
+        <p:sp>
+          <p:nvSpPr>
+            <p:cNvPr id="4" name="Rectangle 3">
+              <a:extLst>
+                <a:ext uri="{FF2B5EF4-FFF2-40B4-BE49-F238E27FC236}">
+                  <a16:creationId xmlns:a16="http://schemas.microsoft.com/office/drawing/2014/main" id="{98AF9D8B-391E-2E49-9C8B-DEA0891F340A}"/>
+                </a:ext>
+              </a:extLst>
+            </p:cNvPr>
+            <p:cNvSpPr/>
+            <p:nvPr/>
+          </p:nvSpPr>
+          <p:spPr>
+            <a:xfrm>
+              <a:off x="2399168" y="4390931"/>
+              <a:ext cx="1788059" cy="371192"/>
+            </a:xfrm>
+            <a:prstGeom prst="rect">
+              <a:avLst/>
+            </a:prstGeom>
+            <a:solidFill>
+              <a:schemeClr val="bg2">
+                <a:lumMod val="25000"/>
+              </a:schemeClr>
+            </a:solidFill>
+          </p:spPr>
+          <p:style>
+            <a:lnRef idx="2">
+              <a:schemeClr val="accent1">
+                <a:shade val="50000"/>
+              </a:schemeClr>
+            </a:lnRef>
+            <a:fillRef idx="1">
+              <a:schemeClr val="accent1"/>
+            </a:fillRef>
+            <a:effectRef idx="0">
+              <a:schemeClr val="accent1"/>
+            </a:effectRef>
+            <a:fontRef idx="minor">
+              <a:schemeClr val="lt1"/>
+            </a:fontRef>
+          </p:style>
+          <p:txBody>
+            <a:bodyPr rtlCol="0" anchor="ctr"/>
+            <a:lstStyle/>
+            <a:p>
+              <a:pPr algn="ctr"/>
+              <a:r>
+                <a:rPr lang="en-US" sz="1400" dirty="0"/>
+                <a:t>Boarding Pass</a:t>
+              </a:r>
+            </a:p>
+          </p:txBody>
+        </p:sp>
+        <p:sp>
+          <p:nvSpPr>
+            <p:cNvPr id="5" name="Rectangle 4">
+              <a:extLst>
+                <a:ext uri="{FF2B5EF4-FFF2-40B4-BE49-F238E27FC236}">
+                  <a16:creationId xmlns:a16="http://schemas.microsoft.com/office/drawing/2014/main" id="{ED59F941-4DBB-4A46-B4E2-4F12E9EBD463}"/>
+                </a:ext>
+              </a:extLst>
+            </p:cNvPr>
+            <p:cNvSpPr/>
+            <p:nvPr/>
+          </p:nvSpPr>
+          <p:spPr>
+            <a:xfrm>
+              <a:off x="4237021" y="4390931"/>
+              <a:ext cx="1858979" cy="371192"/>
+            </a:xfrm>
+            <a:prstGeom prst="rect">
+              <a:avLst/>
+            </a:prstGeom>
+            <a:solidFill>
+              <a:schemeClr val="bg2">
+                <a:lumMod val="25000"/>
+              </a:schemeClr>
+            </a:solidFill>
+          </p:spPr>
+          <p:style>
+            <a:lnRef idx="2">
+              <a:schemeClr val="accent1">
+                <a:shade val="50000"/>
+              </a:schemeClr>
+            </a:lnRef>
+            <a:fillRef idx="1">
+              <a:schemeClr val="accent1"/>
+            </a:fillRef>
+            <a:effectRef idx="0">
+              <a:schemeClr val="accent1"/>
+            </a:effectRef>
+            <a:fontRef idx="minor">
+              <a:schemeClr val="lt1"/>
+            </a:fontRef>
+          </p:style>
+          <p:txBody>
+            <a:bodyPr rtlCol="0" anchor="ctr"/>
+            <a:lstStyle/>
+            <a:p>
+              <a:pPr algn="ctr"/>
+              <a:r>
+                <a:rPr lang="en-US" sz="1400" dirty="0"/>
+                <a:t>Digital ID</a:t>
+              </a:r>
+            </a:p>
+          </p:txBody>
+        </p:sp>
+        <p:sp>
+          <p:nvSpPr>
+            <p:cNvPr id="6" name="Rectangle 5">
+              <a:extLst>
+                <a:ext uri="{FF2B5EF4-FFF2-40B4-BE49-F238E27FC236}">
+                  <a16:creationId xmlns:a16="http://schemas.microsoft.com/office/drawing/2014/main" id="{1338DAFB-BE88-074E-9132-412BAD81BA6F}"/>
+                </a:ext>
+              </a:extLst>
+            </p:cNvPr>
+            <p:cNvSpPr/>
+            <p:nvPr/>
+          </p:nvSpPr>
+          <p:spPr>
+            <a:xfrm>
+              <a:off x="2399168" y="3087232"/>
+              <a:ext cx="3696832" cy="1231271"/>
+            </a:xfrm>
+            <a:prstGeom prst="rect">
+              <a:avLst/>
+            </a:prstGeom>
+            <a:solidFill>
+              <a:schemeClr val="bg1">
+                <a:lumMod val="95000"/>
+              </a:schemeClr>
+            </a:solidFill>
+          </p:spPr>
+          <p:style>
+            <a:lnRef idx="2">
+              <a:schemeClr val="accent1">
+                <a:shade val="50000"/>
+              </a:schemeClr>
+            </a:lnRef>
+            <a:fillRef idx="1">
+              <a:schemeClr val="accent1"/>
+            </a:fillRef>
+            <a:effectRef idx="0">
+              <a:schemeClr val="accent1"/>
+            </a:effectRef>
+            <a:fontRef idx="minor">
+              <a:schemeClr val="lt1"/>
+            </a:fontRef>
+          </p:style>
+          <p:txBody>
+            <a:bodyPr rtlCol="0" anchor="ctr"/>
+            <a:lstStyle/>
+            <a:p>
+              <a:pPr algn="ctr"/>
+              <a:endParaRPr lang="en-US"/>
+            </a:p>
+          </p:txBody>
+        </p:sp>
+      </p:grpSp>
       <p:sp>
         <p:nvSpPr>
           <p:cNvPr id="8" name="Rounded Rectangle 7">
@@ -7791,20 +8096,18 @@
           </p:cNvPr>
           <p:cNvCxnSpPr>
             <a:cxnSpLocks/>
-            <a:stCxn id="18" idx="3"/>
+            <a:stCxn id="3" idx="0"/>
             <a:endCxn id="8" idx="1"/>
           </p:cNvCxnSpPr>
           <p:nvPr/>
         </p:nvCxnSpPr>
         <p:spPr>
-          <a:xfrm flipV="1">
-            <a:off x="3415942" y="2134355"/>
-            <a:ext cx="937266" cy="10954"/>
-          </a:xfrm>
-          <a:prstGeom prst="bentConnector3">
-            <a:avLst>
-              <a:gd name="adj1" fmla="val 50000"/>
-            </a:avLst>
+          <a:xfrm rot="5400000" flipH="1" flipV="1">
+            <a:off x="2710722" y="1442481"/>
+            <a:ext cx="950612" cy="2334360"/>
+          </a:xfrm>
+          <a:prstGeom prst="bentConnector2">
+            <a:avLst/>
           </a:prstGeom>
           <a:ln>
             <a:tailEnd type="triangle"/>
@@ -7933,22 +8236,18 @@
             </a:extLst>
           </p:cNvPr>
           <p:cNvCxnSpPr>
-            <a:cxnSpLocks/>
-            <a:stCxn id="4098" idx="2"/>
+            <a:stCxn id="5" idx="3"/>
             <a:endCxn id="13" idx="1"/>
           </p:cNvCxnSpPr>
           <p:nvPr/>
         </p:nvCxnSpPr>
         <p:spPr>
-          <a:xfrm rot="5400000" flipH="1" flipV="1">
-            <a:off x="3282313" y="2973409"/>
-            <a:ext cx="121889" cy="2019897"/>
-          </a:xfrm>
-          <a:prstGeom prst="bentConnector4">
-            <a:avLst>
-              <a:gd name="adj1" fmla="val -187548"/>
-              <a:gd name="adj2" fmla="val 71471"/>
-            </a:avLst>
+          <a:xfrm flipV="1">
+            <a:off x="3302921" y="3922413"/>
+            <a:ext cx="1050286" cy="1294646"/>
+          </a:xfrm>
+          <a:prstGeom prst="bentConnector3">
+            <a:avLst/>
           </a:prstGeom>
           <a:ln>
             <a:tailEnd type="triangle"/>
@@ -7980,20 +8279,18 @@
           </p:cNvPr>
           <p:cNvCxnSpPr>
             <a:cxnSpLocks/>
-            <a:stCxn id="4100" idx="3"/>
+            <a:stCxn id="4" idx="2"/>
             <a:endCxn id="14" idx="1"/>
           </p:cNvCxnSpPr>
           <p:nvPr/>
         </p:nvCxnSpPr>
         <p:spPr>
-          <a:xfrm>
-            <a:off x="3494536" y="5297525"/>
-            <a:ext cx="858671" cy="331465"/>
-          </a:xfrm>
-          <a:prstGeom prst="bentConnector3">
-            <a:avLst>
-              <a:gd name="adj1" fmla="val 50000"/>
-            </a:avLst>
+          <a:xfrm rot="16200000" flipH="1">
+            <a:off x="2716235" y="3992017"/>
+            <a:ext cx="226335" cy="3047609"/>
+          </a:xfrm>
+          <a:prstGeom prst="bentConnector2">
+            <a:avLst/>
           </a:prstGeom>
           <a:ln>
             <a:tailEnd type="triangle"/>
@@ -8957,6 +9254,1440 @@
         </p:nvSpPr>
         <p:spPr>
           <a:xfrm>
+            <a:off x="3480577" y="359938"/>
+            <a:ext cx="5256375" cy="461665"/>
+          </a:xfrm>
+          <a:prstGeom prst="rect">
+            <a:avLst/>
+          </a:prstGeom>
+          <a:noFill/>
+        </p:spPr>
+        <p:txBody>
+          <a:bodyPr wrap="none" rtlCol="0">
+            <a:spAutoFit/>
+          </a:bodyPr>
+          <a:lstStyle/>
+          <a:p>
+            <a:r>
+              <a:rPr lang="en-US" sz="2400" dirty="0"/>
+              <a:t>Automated Passenger Onboarding Kiosk </a:t>
+            </a:r>
+          </a:p>
+        </p:txBody>
+      </p:sp>
+      <p:pic>
+        <p:nvPicPr>
+          <p:cNvPr id="47" name="Picture 46">
+            <a:extLst>
+              <a:ext uri="{FF2B5EF4-FFF2-40B4-BE49-F238E27FC236}">
+                <a16:creationId xmlns:a16="http://schemas.microsoft.com/office/drawing/2014/main" id="{547062E2-DFA2-3D43-ABD0-78B22E8CBCE4}"/>
+              </a:ext>
+            </a:extLst>
+          </p:cNvPr>
+          <p:cNvPicPr>
+            <a:picLocks noChangeAspect="1"/>
+          </p:cNvPicPr>
+          <p:nvPr/>
+        </p:nvPicPr>
+        <p:blipFill>
+          <a:blip r:embed="rId3"/>
+          <a:stretch>
+            <a:fillRect/>
+          </a:stretch>
+        </p:blipFill>
+        <p:spPr>
+          <a:xfrm>
+            <a:off x="4446798" y="1002270"/>
+            <a:ext cx="1163561" cy="974056"/>
+          </a:xfrm>
+          <a:prstGeom prst="rect">
+            <a:avLst/>
+          </a:prstGeom>
+        </p:spPr>
+      </p:pic>
+      <p:pic>
+        <p:nvPicPr>
+          <p:cNvPr id="48" name="Picture 2">
+            <a:extLst>
+              <a:ext uri="{FF2B5EF4-FFF2-40B4-BE49-F238E27FC236}">
+                <a16:creationId xmlns:a16="http://schemas.microsoft.com/office/drawing/2014/main" id="{232A91AE-D039-6E41-9F40-E1F159E0709F}"/>
+              </a:ext>
+            </a:extLst>
+          </p:cNvPr>
+          <p:cNvPicPr>
+            <a:picLocks noChangeAspect="1" noChangeArrowheads="1"/>
+          </p:cNvPicPr>
+          <p:nvPr/>
+        </p:nvPicPr>
+        <p:blipFill>
+          <a:blip r:embed="rId4">
+            <a:extLst>
+              <a:ext uri="{28A0092B-C50C-407E-A947-70E740481C1C}">
+                <a14:useLocalDpi xmlns:a14="http://schemas.microsoft.com/office/drawing/2010/main" val="0"/>
+              </a:ext>
+            </a:extLst>
+          </a:blip>
+          <a:srcRect/>
+          <a:stretch>
+            <a:fillRect/>
+          </a:stretch>
+        </p:blipFill>
+        <p:spPr bwMode="auto">
+          <a:xfrm>
+            <a:off x="4074539" y="2794695"/>
+            <a:ext cx="1734746" cy="950612"/>
+          </a:xfrm>
+          <a:prstGeom prst="rect">
+            <a:avLst/>
+          </a:prstGeom>
+          <a:noFill/>
+          <a:extLst>
+            <a:ext uri="{909E8E84-426E-40DD-AFC4-6F175D3DCCD1}">
+              <a14:hiddenFill xmlns:a14="http://schemas.microsoft.com/office/drawing/2010/main">
+                <a:solidFill>
+                  <a:srgbClr val="FFFFFF"/>
+                </a:solidFill>
+              </a14:hiddenFill>
+            </a:ext>
+          </a:extLst>
+        </p:spPr>
+      </p:pic>
+      <p:pic>
+        <p:nvPicPr>
+          <p:cNvPr id="49" name="Picture 4" descr="Boarding Pass Template">
+            <a:extLst>
+              <a:ext uri="{FF2B5EF4-FFF2-40B4-BE49-F238E27FC236}">
+                <a16:creationId xmlns:a16="http://schemas.microsoft.com/office/drawing/2014/main" id="{159908DA-C3E2-2743-A5FF-D3812D63B01E}"/>
+              </a:ext>
+            </a:extLst>
+          </p:cNvPr>
+          <p:cNvPicPr>
+            <a:picLocks noChangeAspect="1" noChangeArrowheads="1"/>
+          </p:cNvPicPr>
+          <p:nvPr/>
+        </p:nvPicPr>
+        <p:blipFill>
+          <a:blip r:embed="rId5">
+            <a:extLst>
+              <a:ext uri="{28A0092B-C50C-407E-A947-70E740481C1C}">
+                <a14:useLocalDpi xmlns:a14="http://schemas.microsoft.com/office/drawing/2010/main" val="0"/>
+              </a:ext>
+            </a:extLst>
+          </a:blip>
+          <a:srcRect/>
+          <a:stretch>
+            <a:fillRect/>
+          </a:stretch>
+        </p:blipFill>
+        <p:spPr bwMode="auto">
+          <a:xfrm>
+            <a:off x="3894168" y="4343399"/>
+            <a:ext cx="2268820" cy="998517"/>
+          </a:xfrm>
+          <a:prstGeom prst="rect">
+            <a:avLst/>
+          </a:prstGeom>
+          <a:noFill/>
+          <a:extLst>
+            <a:ext uri="{909E8E84-426E-40DD-AFC4-6F175D3DCCD1}">
+              <a14:hiddenFill xmlns:a14="http://schemas.microsoft.com/office/drawing/2010/main">
+                <a:solidFill>
+                  <a:srgbClr val="FFFFFF"/>
+                </a:solidFill>
+              </a14:hiddenFill>
+            </a:ext>
+          </a:extLst>
+        </p:spPr>
+      </p:pic>
+      <p:pic>
+        <p:nvPicPr>
+          <p:cNvPr id="15" name="Picture 14" descr="A picture containing electronics, projector&#10;&#10;Description automatically generated">
+            <a:extLst>
+              <a:ext uri="{FF2B5EF4-FFF2-40B4-BE49-F238E27FC236}">
+                <a16:creationId xmlns:a16="http://schemas.microsoft.com/office/drawing/2014/main" id="{1D636D44-3A48-9745-805B-32B1471FF426}"/>
+              </a:ext>
+            </a:extLst>
+          </p:cNvPr>
+          <p:cNvPicPr>
+            <a:picLocks noChangeAspect="1"/>
+          </p:cNvPicPr>
+          <p:nvPr/>
+        </p:nvPicPr>
+        <p:blipFill>
+          <a:blip r:embed="rId6"/>
+          <a:stretch>
+            <a:fillRect/>
+          </a:stretch>
+        </p:blipFill>
+        <p:spPr>
+          <a:xfrm>
+            <a:off x="1713208" y="3059507"/>
+            <a:ext cx="586856" cy="622067"/>
+          </a:xfrm>
+          <a:prstGeom prst="rect">
+            <a:avLst/>
+          </a:prstGeom>
+          <a:solidFill>
+            <a:schemeClr val="accent1"/>
+          </a:solidFill>
+        </p:spPr>
+      </p:pic>
+    </p:spTree>
+    <p:extLst>
+      <p:ext uri="{BB962C8B-B14F-4D97-AF65-F5344CB8AC3E}">
+        <p14:creationId xmlns:p14="http://schemas.microsoft.com/office/powerpoint/2010/main" val="1268887329"/>
+      </p:ext>
+    </p:extLst>
+  </p:cSld>
+  <p:clrMapOvr>
+    <a:masterClrMapping/>
+  </p:clrMapOvr>
+</p:sld>
+</file>
+
+<file path=ppt/slides/slide5.xml><?xml version="1.0" encoding="utf-8"?>
+<p:sld xmlns:a="http://schemas.openxmlformats.org/drawingml/2006/main" xmlns:r="http://schemas.openxmlformats.org/officeDocument/2006/relationships" xmlns:p="http://schemas.openxmlformats.org/presentationml/2006/main">
+  <p:cSld>
+    <p:spTree>
+      <p:nvGrpSpPr>
+        <p:cNvPr id="1" name=""/>
+        <p:cNvGrpSpPr/>
+        <p:nvPr/>
+      </p:nvGrpSpPr>
+      <p:grpSpPr>
+        <a:xfrm>
+          <a:off x="0" y="0"/>
+          <a:ext cx="0" cy="0"/>
+          <a:chOff x="0" y="0"/>
+          <a:chExt cx="0" cy="0"/>
+        </a:xfrm>
+      </p:grpSpPr>
+      <p:sp>
+        <p:nvSpPr>
+          <p:cNvPr id="8" name="Rounded Rectangle 7">
+            <a:extLst>
+              <a:ext uri="{FF2B5EF4-FFF2-40B4-BE49-F238E27FC236}">
+                <a16:creationId xmlns:a16="http://schemas.microsoft.com/office/drawing/2014/main" id="{A53717EC-7CB4-D24E-BA96-5DDBAF7C0342}"/>
+              </a:ext>
+            </a:extLst>
+          </p:cNvPr>
+          <p:cNvSpPr/>
+          <p:nvPr/>
+        </p:nvSpPr>
+        <p:spPr>
+          <a:xfrm>
+            <a:off x="4353208" y="1966865"/>
+            <a:ext cx="1397251" cy="334979"/>
+          </a:xfrm>
+          <a:prstGeom prst="roundRect">
+            <a:avLst/>
+          </a:prstGeom>
+        </p:spPr>
+        <p:style>
+          <a:lnRef idx="2">
+            <a:schemeClr val="accent1">
+              <a:shade val="50000"/>
+            </a:schemeClr>
+          </a:lnRef>
+          <a:fillRef idx="1">
+            <a:schemeClr val="accent1"/>
+          </a:fillRef>
+          <a:effectRef idx="0">
+            <a:schemeClr val="accent1"/>
+          </a:effectRef>
+          <a:fontRef idx="minor">
+            <a:schemeClr val="lt1"/>
+          </a:fontRef>
+        </p:style>
+        <p:txBody>
+          <a:bodyPr rtlCol="0" anchor="ctr"/>
+          <a:lstStyle/>
+          <a:p>
+            <a:pPr algn="ctr"/>
+            <a:r>
+              <a:rPr lang="en-US" dirty="0"/>
+              <a:t>Video</a:t>
+            </a:r>
+          </a:p>
+        </p:txBody>
+      </p:sp>
+      <p:cxnSp>
+        <p:nvCxnSpPr>
+          <p:cNvPr id="10" name="Elbow Connector 9">
+            <a:extLst>
+              <a:ext uri="{FF2B5EF4-FFF2-40B4-BE49-F238E27FC236}">
+                <a16:creationId xmlns:a16="http://schemas.microsoft.com/office/drawing/2014/main" id="{3E278369-D9E2-3F4B-97EE-1C832BC8CB27}"/>
+              </a:ext>
+            </a:extLst>
+          </p:cNvPr>
+          <p:cNvCxnSpPr>
+            <a:cxnSpLocks/>
+            <a:stCxn id="18" idx="3"/>
+            <a:endCxn id="8" idx="1"/>
+          </p:cNvCxnSpPr>
+          <p:nvPr/>
+        </p:nvCxnSpPr>
+        <p:spPr>
+          <a:xfrm flipV="1">
+            <a:off x="3415942" y="2134355"/>
+            <a:ext cx="937266" cy="10954"/>
+          </a:xfrm>
+          <a:prstGeom prst="bentConnector3">
+            <a:avLst>
+              <a:gd name="adj1" fmla="val 50000"/>
+            </a:avLst>
+          </a:prstGeom>
+          <a:ln>
+            <a:tailEnd type="triangle"/>
+          </a:ln>
+        </p:spPr>
+        <p:style>
+          <a:lnRef idx="1">
+            <a:schemeClr val="accent2"/>
+          </a:lnRef>
+          <a:fillRef idx="0">
+            <a:schemeClr val="accent2"/>
+          </a:fillRef>
+          <a:effectRef idx="0">
+            <a:schemeClr val="accent2"/>
+          </a:effectRef>
+          <a:fontRef idx="minor">
+            <a:schemeClr val="tx1"/>
+          </a:fontRef>
+        </p:style>
+      </p:cxnSp>
+      <p:sp>
+        <p:nvSpPr>
+          <p:cNvPr id="13" name="Rounded Rectangle 12">
+            <a:extLst>
+              <a:ext uri="{FF2B5EF4-FFF2-40B4-BE49-F238E27FC236}">
+                <a16:creationId xmlns:a16="http://schemas.microsoft.com/office/drawing/2014/main" id="{1B8495CF-E2F9-D545-835B-4E6B40B645CE}"/>
+              </a:ext>
+            </a:extLst>
+          </p:cNvPr>
+          <p:cNvSpPr/>
+          <p:nvPr/>
+        </p:nvSpPr>
+        <p:spPr>
+          <a:xfrm>
+            <a:off x="4353207" y="3754923"/>
+            <a:ext cx="1397251" cy="334979"/>
+          </a:xfrm>
+          <a:prstGeom prst="roundRect">
+            <a:avLst/>
+          </a:prstGeom>
+        </p:spPr>
+        <p:style>
+          <a:lnRef idx="2">
+            <a:schemeClr val="accent1">
+              <a:shade val="50000"/>
+            </a:schemeClr>
+          </a:lnRef>
+          <a:fillRef idx="1">
+            <a:schemeClr val="accent1"/>
+          </a:fillRef>
+          <a:effectRef idx="0">
+            <a:schemeClr val="accent1"/>
+          </a:effectRef>
+          <a:fontRef idx="minor">
+            <a:schemeClr val="lt1"/>
+          </a:fontRef>
+        </p:style>
+        <p:txBody>
+          <a:bodyPr rtlCol="0" anchor="ctr"/>
+          <a:lstStyle/>
+          <a:p>
+            <a:pPr algn="ctr"/>
+            <a:r>
+              <a:rPr lang="en-US" dirty="0"/>
+              <a:t>ID</a:t>
+            </a:r>
+          </a:p>
+        </p:txBody>
+      </p:sp>
+      <p:sp>
+        <p:nvSpPr>
+          <p:cNvPr id="14" name="Rounded Rectangle 13">
+            <a:extLst>
+              <a:ext uri="{FF2B5EF4-FFF2-40B4-BE49-F238E27FC236}">
+                <a16:creationId xmlns:a16="http://schemas.microsoft.com/office/drawing/2014/main" id="{EAFC350A-2632-4E40-B29F-353EAE85CEFB}"/>
+              </a:ext>
+            </a:extLst>
+          </p:cNvPr>
+          <p:cNvSpPr/>
+          <p:nvPr/>
+        </p:nvSpPr>
+        <p:spPr>
+          <a:xfrm>
+            <a:off x="4353207" y="5461500"/>
+            <a:ext cx="1397251" cy="334979"/>
+          </a:xfrm>
+          <a:prstGeom prst="roundRect">
+            <a:avLst/>
+          </a:prstGeom>
+        </p:spPr>
+        <p:style>
+          <a:lnRef idx="2">
+            <a:schemeClr val="accent1">
+              <a:shade val="50000"/>
+            </a:schemeClr>
+          </a:lnRef>
+          <a:fillRef idx="1">
+            <a:schemeClr val="accent1"/>
+          </a:fillRef>
+          <a:effectRef idx="0">
+            <a:schemeClr val="accent1"/>
+          </a:effectRef>
+          <a:fontRef idx="minor">
+            <a:schemeClr val="lt1"/>
+          </a:fontRef>
+        </p:style>
+        <p:txBody>
+          <a:bodyPr rtlCol="0" anchor="ctr"/>
+          <a:lstStyle/>
+          <a:p>
+            <a:pPr algn="ctr"/>
+            <a:r>
+              <a:rPr lang="en-US" sz="1400" dirty="0"/>
+              <a:t>Boarding Pass</a:t>
+            </a:r>
+          </a:p>
+        </p:txBody>
+      </p:sp>
+      <p:cxnSp>
+        <p:nvCxnSpPr>
+          <p:cNvPr id="19" name="Elbow Connector 18">
+            <a:extLst>
+              <a:ext uri="{FF2B5EF4-FFF2-40B4-BE49-F238E27FC236}">
+                <a16:creationId xmlns:a16="http://schemas.microsoft.com/office/drawing/2014/main" id="{52F5EFE9-3F92-0E49-B851-C2931E4C59EE}"/>
+              </a:ext>
+            </a:extLst>
+          </p:cNvPr>
+          <p:cNvCxnSpPr>
+            <a:cxnSpLocks/>
+            <a:stCxn id="4098" idx="2"/>
+            <a:endCxn id="13" idx="1"/>
+          </p:cNvCxnSpPr>
+          <p:nvPr/>
+        </p:nvCxnSpPr>
+        <p:spPr>
+          <a:xfrm rot="5400000" flipH="1" flipV="1">
+            <a:off x="3282313" y="2973409"/>
+            <a:ext cx="121889" cy="2019897"/>
+          </a:xfrm>
+          <a:prstGeom prst="bentConnector4">
+            <a:avLst>
+              <a:gd name="adj1" fmla="val -187548"/>
+              <a:gd name="adj2" fmla="val 71471"/>
+            </a:avLst>
+          </a:prstGeom>
+          <a:ln>
+            <a:tailEnd type="triangle"/>
+          </a:ln>
+        </p:spPr>
+        <p:style>
+          <a:lnRef idx="1">
+            <a:schemeClr val="accent2"/>
+          </a:lnRef>
+          <a:fillRef idx="0">
+            <a:schemeClr val="accent2"/>
+          </a:fillRef>
+          <a:effectRef idx="0">
+            <a:schemeClr val="accent2"/>
+          </a:effectRef>
+          <a:fontRef idx="minor">
+            <a:schemeClr val="tx1"/>
+          </a:fontRef>
+        </p:style>
+      </p:cxnSp>
+      <p:cxnSp>
+        <p:nvCxnSpPr>
+          <p:cNvPr id="21" name="Elbow Connector 20">
+            <a:extLst>
+              <a:ext uri="{FF2B5EF4-FFF2-40B4-BE49-F238E27FC236}">
+                <a16:creationId xmlns:a16="http://schemas.microsoft.com/office/drawing/2014/main" id="{FD151AE7-B95F-464B-B99C-AC1FAB6E7791}"/>
+              </a:ext>
+            </a:extLst>
+          </p:cNvPr>
+          <p:cNvCxnSpPr>
+            <a:cxnSpLocks/>
+            <a:stCxn id="4100" idx="3"/>
+            <a:endCxn id="14" idx="1"/>
+          </p:cNvCxnSpPr>
+          <p:nvPr/>
+        </p:nvCxnSpPr>
+        <p:spPr>
+          <a:xfrm>
+            <a:off x="3494536" y="5297525"/>
+            <a:ext cx="858671" cy="331465"/>
+          </a:xfrm>
+          <a:prstGeom prst="bentConnector3">
+            <a:avLst>
+              <a:gd name="adj1" fmla="val 50000"/>
+            </a:avLst>
+          </a:prstGeom>
+          <a:ln>
+            <a:tailEnd type="triangle"/>
+          </a:ln>
+        </p:spPr>
+        <p:style>
+          <a:lnRef idx="1">
+            <a:schemeClr val="accent2"/>
+          </a:lnRef>
+          <a:fillRef idx="0">
+            <a:schemeClr val="accent2"/>
+          </a:fillRef>
+          <a:effectRef idx="0">
+            <a:schemeClr val="accent2"/>
+          </a:effectRef>
+          <a:fontRef idx="minor">
+            <a:schemeClr val="tx1"/>
+          </a:fontRef>
+        </p:style>
+      </p:cxnSp>
+      <p:sp>
+        <p:nvSpPr>
+          <p:cNvPr id="29" name="Diamond 28">
+            <a:extLst>
+              <a:ext uri="{FF2B5EF4-FFF2-40B4-BE49-F238E27FC236}">
+                <a16:creationId xmlns:a16="http://schemas.microsoft.com/office/drawing/2014/main" id="{D9660AE8-843F-7843-B7D8-03F1EBCEDF64}"/>
+              </a:ext>
+            </a:extLst>
+          </p:cNvPr>
+          <p:cNvSpPr/>
+          <p:nvPr/>
+        </p:nvSpPr>
+        <p:spPr>
+          <a:xfrm>
+            <a:off x="6231801" y="1541353"/>
+            <a:ext cx="1780589" cy="1186004"/>
+          </a:xfrm>
+          <a:prstGeom prst="diamond">
+            <a:avLst/>
+          </a:prstGeom>
+        </p:spPr>
+        <p:style>
+          <a:lnRef idx="2">
+            <a:schemeClr val="accent1">
+              <a:shade val="50000"/>
+            </a:schemeClr>
+          </a:lnRef>
+          <a:fillRef idx="1">
+            <a:schemeClr val="accent1"/>
+          </a:fillRef>
+          <a:effectRef idx="0">
+            <a:schemeClr val="accent1"/>
+          </a:effectRef>
+          <a:fontRef idx="minor">
+            <a:schemeClr val="lt1"/>
+          </a:fontRef>
+        </p:style>
+        <p:txBody>
+          <a:bodyPr rtlCol="0" anchor="ctr"/>
+          <a:lstStyle/>
+          <a:p>
+            <a:pPr algn="ctr"/>
+            <a:r>
+              <a:rPr lang="en-US" dirty="0"/>
+              <a:t>Video</a:t>
+            </a:r>
+          </a:p>
+          <a:p>
+            <a:pPr algn="ctr"/>
+            <a:r>
+              <a:rPr lang="en-US" sz="1400" dirty="0"/>
+              <a:t>Analyzer</a:t>
+            </a:r>
+          </a:p>
+        </p:txBody>
+      </p:sp>
+      <p:sp>
+        <p:nvSpPr>
+          <p:cNvPr id="30" name="Diamond 29">
+            <a:extLst>
+              <a:ext uri="{FF2B5EF4-FFF2-40B4-BE49-F238E27FC236}">
+                <a16:creationId xmlns:a16="http://schemas.microsoft.com/office/drawing/2014/main" id="{A5747B9B-A1CC-DB45-B07F-BC219AA9F55F}"/>
+              </a:ext>
+            </a:extLst>
+          </p:cNvPr>
+          <p:cNvSpPr/>
+          <p:nvPr/>
+        </p:nvSpPr>
+        <p:spPr>
+          <a:xfrm>
+            <a:off x="6231801" y="3329410"/>
+            <a:ext cx="2023454" cy="1186004"/>
+          </a:xfrm>
+          <a:prstGeom prst="diamond">
+            <a:avLst/>
+          </a:prstGeom>
+        </p:spPr>
+        <p:style>
+          <a:lnRef idx="2">
+            <a:schemeClr val="accent1">
+              <a:shade val="50000"/>
+            </a:schemeClr>
+          </a:lnRef>
+          <a:fillRef idx="1">
+            <a:schemeClr val="accent1"/>
+          </a:fillRef>
+          <a:effectRef idx="0">
+            <a:schemeClr val="accent1"/>
+          </a:effectRef>
+          <a:fontRef idx="minor">
+            <a:schemeClr val="lt1"/>
+          </a:fontRef>
+        </p:style>
+        <p:txBody>
+          <a:bodyPr rtlCol="0" anchor="ctr"/>
+          <a:lstStyle/>
+          <a:p>
+            <a:pPr algn="ctr"/>
+            <a:r>
+              <a:rPr lang="en-US" sz="1200" dirty="0"/>
+              <a:t>ID </a:t>
+            </a:r>
+          </a:p>
+          <a:p>
+            <a:pPr algn="ctr"/>
+            <a:r>
+              <a:rPr lang="en-US" sz="1400" dirty="0"/>
+              <a:t>Recognizer</a:t>
+            </a:r>
+            <a:endParaRPr lang="en-US" sz="1200" dirty="0"/>
+          </a:p>
+        </p:txBody>
+      </p:sp>
+      <p:sp>
+        <p:nvSpPr>
+          <p:cNvPr id="31" name="Diamond 30">
+            <a:extLst>
+              <a:ext uri="{FF2B5EF4-FFF2-40B4-BE49-F238E27FC236}">
+                <a16:creationId xmlns:a16="http://schemas.microsoft.com/office/drawing/2014/main" id="{A0F878C0-1848-3947-9689-46F8758F81C8}"/>
+              </a:ext>
+            </a:extLst>
+          </p:cNvPr>
+          <p:cNvSpPr/>
+          <p:nvPr/>
+        </p:nvSpPr>
+        <p:spPr>
+          <a:xfrm>
+            <a:off x="6231800" y="5027689"/>
+            <a:ext cx="2023454" cy="1186004"/>
+          </a:xfrm>
+          <a:prstGeom prst="diamond">
+            <a:avLst/>
+          </a:prstGeom>
+        </p:spPr>
+        <p:style>
+          <a:lnRef idx="2">
+            <a:schemeClr val="accent1">
+              <a:shade val="50000"/>
+            </a:schemeClr>
+          </a:lnRef>
+          <a:fillRef idx="1">
+            <a:schemeClr val="accent1"/>
+          </a:fillRef>
+          <a:effectRef idx="0">
+            <a:schemeClr val="accent1"/>
+          </a:effectRef>
+          <a:fontRef idx="minor">
+            <a:schemeClr val="lt1"/>
+          </a:fontRef>
+        </p:style>
+        <p:txBody>
+          <a:bodyPr rtlCol="0" anchor="ctr"/>
+          <a:lstStyle/>
+          <a:p>
+            <a:pPr algn="ctr"/>
+            <a:r>
+              <a:rPr lang="en-US" sz="1200" dirty="0"/>
+              <a:t>Custom</a:t>
+            </a:r>
+          </a:p>
+          <a:p>
+            <a:pPr algn="ctr"/>
+            <a:r>
+              <a:rPr lang="en-US" sz="1200" dirty="0"/>
+              <a:t>Form </a:t>
+            </a:r>
+          </a:p>
+          <a:p>
+            <a:pPr algn="ctr"/>
+            <a:r>
+              <a:rPr lang="en-US" sz="1400" dirty="0"/>
+              <a:t>Recognizer</a:t>
+            </a:r>
+            <a:endParaRPr lang="en-US" sz="1200" dirty="0"/>
+          </a:p>
+        </p:txBody>
+      </p:sp>
+      <p:pic>
+        <p:nvPicPr>
+          <p:cNvPr id="2050" name="Picture 2" descr="Poker Face Icon – Free Download, PNG and Vector">
+            <a:extLst>
+              <a:ext uri="{FF2B5EF4-FFF2-40B4-BE49-F238E27FC236}">
+                <a16:creationId xmlns:a16="http://schemas.microsoft.com/office/drawing/2014/main" id="{DB15A026-E47F-404F-B2AE-FEBC9BA58AB8}"/>
+              </a:ext>
+            </a:extLst>
+          </p:cNvPr>
+          <p:cNvPicPr>
+            <a:picLocks noChangeAspect="1" noChangeArrowheads="1"/>
+          </p:cNvPicPr>
+          <p:nvPr/>
+        </p:nvPicPr>
+        <p:blipFill>
+          <a:blip r:embed="rId2">
+            <a:extLst>
+              <a:ext uri="{28A0092B-C50C-407E-A947-70E740481C1C}">
+                <a14:useLocalDpi xmlns:a14="http://schemas.microsoft.com/office/drawing/2010/main" val="0"/>
+              </a:ext>
+            </a:extLst>
+          </a:blip>
+          <a:srcRect/>
+          <a:stretch>
+            <a:fillRect/>
+          </a:stretch>
+        </p:blipFill>
+        <p:spPr bwMode="auto">
+          <a:xfrm>
+            <a:off x="8771320" y="1822654"/>
+            <a:ext cx="645311" cy="645311"/>
+          </a:xfrm>
+          <a:prstGeom prst="rect">
+            <a:avLst/>
+          </a:prstGeom>
+          <a:noFill/>
+          <a:extLst>
+            <a:ext uri="{909E8E84-426E-40DD-AFC4-6F175D3DCCD1}">
+              <a14:hiddenFill xmlns:a14="http://schemas.microsoft.com/office/drawing/2010/main">
+                <a:solidFill>
+                  <a:srgbClr val="FFFFFF"/>
+                </a:solidFill>
+              </a14:hiddenFill>
+            </a:ext>
+          </a:extLst>
+        </p:spPr>
+      </p:pic>
+      <p:pic>
+        <p:nvPicPr>
+          <p:cNvPr id="33" name="Picture 2" descr="Poker Face Icon – Free Download, PNG and Vector">
+            <a:extLst>
+              <a:ext uri="{FF2B5EF4-FFF2-40B4-BE49-F238E27FC236}">
+                <a16:creationId xmlns:a16="http://schemas.microsoft.com/office/drawing/2014/main" id="{BD7684D6-DE42-B543-BD92-884C3DCCAEFF}"/>
+              </a:ext>
+            </a:extLst>
+          </p:cNvPr>
+          <p:cNvPicPr>
+            <a:picLocks noChangeAspect="1" noChangeArrowheads="1"/>
+          </p:cNvPicPr>
+          <p:nvPr/>
+        </p:nvPicPr>
+        <p:blipFill>
+          <a:blip r:embed="rId2">
+            <a:extLst>
+              <a:ext uri="{28A0092B-C50C-407E-A947-70E740481C1C}">
+                <a14:useLocalDpi xmlns:a14="http://schemas.microsoft.com/office/drawing/2010/main" val="0"/>
+              </a:ext>
+            </a:extLst>
+          </a:blip>
+          <a:srcRect/>
+          <a:stretch>
+            <a:fillRect/>
+          </a:stretch>
+        </p:blipFill>
+        <p:spPr bwMode="auto">
+          <a:xfrm>
+            <a:off x="9268611" y="1827956"/>
+            <a:ext cx="645311" cy="645311"/>
+          </a:xfrm>
+          <a:prstGeom prst="rect">
+            <a:avLst/>
+          </a:prstGeom>
+          <a:noFill/>
+          <a:extLst>
+            <a:ext uri="{909E8E84-426E-40DD-AFC4-6F175D3DCCD1}">
+              <a14:hiddenFill xmlns:a14="http://schemas.microsoft.com/office/drawing/2010/main">
+                <a:solidFill>
+                  <a:srgbClr val="FFFFFF"/>
+                </a:solidFill>
+              </a14:hiddenFill>
+            </a:ext>
+          </a:extLst>
+        </p:spPr>
+      </p:pic>
+      <p:pic>
+        <p:nvPicPr>
+          <p:cNvPr id="34" name="Picture 2" descr="Poker Face Icon – Free Download, PNG and Vector">
+            <a:extLst>
+              <a:ext uri="{FF2B5EF4-FFF2-40B4-BE49-F238E27FC236}">
+                <a16:creationId xmlns:a16="http://schemas.microsoft.com/office/drawing/2014/main" id="{450354AD-9301-C240-8D2F-A91BA535491E}"/>
+              </a:ext>
+            </a:extLst>
+          </p:cNvPr>
+          <p:cNvPicPr>
+            <a:picLocks noChangeAspect="1" noChangeArrowheads="1"/>
+          </p:cNvPicPr>
+          <p:nvPr/>
+        </p:nvPicPr>
+        <p:blipFill>
+          <a:blip r:embed="rId2">
+            <a:extLst>
+              <a:ext uri="{28A0092B-C50C-407E-A947-70E740481C1C}">
+                <a14:useLocalDpi xmlns:a14="http://schemas.microsoft.com/office/drawing/2010/main" val="0"/>
+              </a:ext>
+            </a:extLst>
+          </a:blip>
+          <a:srcRect/>
+          <a:stretch>
+            <a:fillRect/>
+          </a:stretch>
+        </p:blipFill>
+        <p:spPr bwMode="auto">
+          <a:xfrm>
+            <a:off x="9735439" y="1827956"/>
+            <a:ext cx="645311" cy="645311"/>
+          </a:xfrm>
+          <a:prstGeom prst="rect">
+            <a:avLst/>
+          </a:prstGeom>
+          <a:noFill/>
+          <a:extLst>
+            <a:ext uri="{909E8E84-426E-40DD-AFC4-6F175D3DCCD1}">
+              <a14:hiddenFill xmlns:a14="http://schemas.microsoft.com/office/drawing/2010/main">
+                <a:solidFill>
+                  <a:srgbClr val="FFFFFF"/>
+                </a:solidFill>
+              </a14:hiddenFill>
+            </a:ext>
+          </a:extLst>
+        </p:spPr>
+      </p:pic>
+      <p:pic>
+        <p:nvPicPr>
+          <p:cNvPr id="35" name="Picture 2" descr="Poker Face Icon – Free Download, PNG and Vector">
+            <a:extLst>
+              <a:ext uri="{FF2B5EF4-FFF2-40B4-BE49-F238E27FC236}">
+                <a16:creationId xmlns:a16="http://schemas.microsoft.com/office/drawing/2014/main" id="{83377665-3955-3C48-9A5D-7C5832C1CCAD}"/>
+              </a:ext>
+            </a:extLst>
+          </p:cNvPr>
+          <p:cNvPicPr>
+            <a:picLocks noChangeAspect="1" noChangeArrowheads="1"/>
+          </p:cNvPicPr>
+          <p:nvPr/>
+        </p:nvPicPr>
+        <p:blipFill>
+          <a:blip r:embed="rId2">
+            <a:extLst>
+              <a:ext uri="{28A0092B-C50C-407E-A947-70E740481C1C}">
+                <a14:useLocalDpi xmlns:a14="http://schemas.microsoft.com/office/drawing/2010/main" val="0"/>
+              </a:ext>
+            </a:extLst>
+          </a:blip>
+          <a:srcRect/>
+          <a:stretch>
+            <a:fillRect/>
+          </a:stretch>
+        </p:blipFill>
+        <p:spPr bwMode="auto">
+          <a:xfrm>
+            <a:off x="10231295" y="1827955"/>
+            <a:ext cx="645311" cy="645311"/>
+          </a:xfrm>
+          <a:prstGeom prst="rect">
+            <a:avLst/>
+          </a:prstGeom>
+          <a:noFill/>
+          <a:extLst>
+            <a:ext uri="{909E8E84-426E-40DD-AFC4-6F175D3DCCD1}">
+              <a14:hiddenFill xmlns:a14="http://schemas.microsoft.com/office/drawing/2010/main">
+                <a:solidFill>
+                  <a:srgbClr val="FFFFFF"/>
+                </a:solidFill>
+              </a14:hiddenFill>
+            </a:ext>
+          </a:extLst>
+        </p:spPr>
+      </p:pic>
+      <p:pic>
+        <p:nvPicPr>
+          <p:cNvPr id="36" name="Picture 2" descr="Poker Face Icon – Free Download, PNG and Vector">
+            <a:extLst>
+              <a:ext uri="{FF2B5EF4-FFF2-40B4-BE49-F238E27FC236}">
+                <a16:creationId xmlns:a16="http://schemas.microsoft.com/office/drawing/2014/main" id="{7433E3E5-6435-4441-99B9-5C44D1DC4B88}"/>
+              </a:ext>
+            </a:extLst>
+          </p:cNvPr>
+          <p:cNvPicPr>
+            <a:picLocks noChangeAspect="1" noChangeArrowheads="1"/>
+          </p:cNvPicPr>
+          <p:nvPr/>
+        </p:nvPicPr>
+        <p:blipFill>
+          <a:blip r:embed="rId2">
+            <a:extLst>
+              <a:ext uri="{28A0092B-C50C-407E-A947-70E740481C1C}">
+                <a14:useLocalDpi xmlns:a14="http://schemas.microsoft.com/office/drawing/2010/main" val="0"/>
+              </a:ext>
+            </a:extLst>
+          </a:blip>
+          <a:srcRect/>
+          <a:stretch>
+            <a:fillRect/>
+          </a:stretch>
+        </p:blipFill>
+        <p:spPr bwMode="auto">
+          <a:xfrm>
+            <a:off x="10698052" y="1827954"/>
+            <a:ext cx="645311" cy="645311"/>
+          </a:xfrm>
+          <a:prstGeom prst="rect">
+            <a:avLst/>
+          </a:prstGeom>
+          <a:noFill/>
+          <a:extLst>
+            <a:ext uri="{909E8E84-426E-40DD-AFC4-6F175D3DCCD1}">
+              <a14:hiddenFill xmlns:a14="http://schemas.microsoft.com/office/drawing/2010/main">
+                <a:solidFill>
+                  <a:srgbClr val="FFFFFF"/>
+                </a:solidFill>
+              </a14:hiddenFill>
+            </a:ext>
+          </a:extLst>
+        </p:spPr>
+      </p:pic>
+      <p:pic>
+        <p:nvPicPr>
+          <p:cNvPr id="37" name="Picture 2" descr="Poker Face Icon – Free Download, PNG and Vector">
+            <a:extLst>
+              <a:ext uri="{FF2B5EF4-FFF2-40B4-BE49-F238E27FC236}">
+                <a16:creationId xmlns:a16="http://schemas.microsoft.com/office/drawing/2014/main" id="{09441BAB-005E-034D-8970-8816C2B0B11C}"/>
+              </a:ext>
+            </a:extLst>
+          </p:cNvPr>
+          <p:cNvPicPr>
+            <a:picLocks noChangeAspect="1" noChangeArrowheads="1"/>
+          </p:cNvPicPr>
+          <p:nvPr/>
+        </p:nvPicPr>
+        <p:blipFill>
+          <a:blip r:embed="rId2">
+            <a:extLst>
+              <a:ext uri="{28A0092B-C50C-407E-A947-70E740481C1C}">
+                <a14:useLocalDpi xmlns:a14="http://schemas.microsoft.com/office/drawing/2010/main" val="0"/>
+              </a:ext>
+            </a:extLst>
+          </a:blip>
+          <a:srcRect/>
+          <a:stretch>
+            <a:fillRect/>
+          </a:stretch>
+        </p:blipFill>
+        <p:spPr bwMode="auto">
+          <a:xfrm>
+            <a:off x="9172192" y="3246341"/>
+            <a:ext cx="645311" cy="645311"/>
+          </a:xfrm>
+          <a:prstGeom prst="rect">
+            <a:avLst/>
+          </a:prstGeom>
+          <a:noFill/>
+          <a:extLst>
+            <a:ext uri="{909E8E84-426E-40DD-AFC4-6F175D3DCCD1}">
+              <a14:hiddenFill xmlns:a14="http://schemas.microsoft.com/office/drawing/2010/main">
+                <a:solidFill>
+                  <a:srgbClr val="FFFFFF"/>
+                </a:solidFill>
+              </a14:hiddenFill>
+            </a:ext>
+          </a:extLst>
+        </p:spPr>
+      </p:pic>
+      <p:sp>
+        <p:nvSpPr>
+          <p:cNvPr id="32" name="TextBox 31">
+            <a:extLst>
+              <a:ext uri="{FF2B5EF4-FFF2-40B4-BE49-F238E27FC236}">
+                <a16:creationId xmlns:a16="http://schemas.microsoft.com/office/drawing/2014/main" id="{53D0F3A1-5935-0F4B-A73F-03E92FAE39DA}"/>
+              </a:ext>
+            </a:extLst>
+          </p:cNvPr>
+          <p:cNvSpPr txBox="1"/>
+          <p:nvPr/>
+        </p:nvSpPr>
+        <p:spPr>
+          <a:xfrm>
+            <a:off x="8775012" y="1413912"/>
+            <a:ext cx="2155334" cy="369332"/>
+          </a:xfrm>
+          <a:prstGeom prst="rect">
+            <a:avLst/>
+          </a:prstGeom>
+          <a:noFill/>
+        </p:spPr>
+        <p:txBody>
+          <a:bodyPr wrap="none" rtlCol="0">
+            <a:spAutoFit/>
+          </a:bodyPr>
+          <a:lstStyle/>
+          <a:p>
+            <a:r>
+              <a:rPr lang="en-US" dirty="0"/>
+              <a:t>Emotion | Sentiment</a:t>
+            </a:r>
+          </a:p>
+        </p:txBody>
+      </p:sp>
+      <p:sp>
+        <p:nvSpPr>
+          <p:cNvPr id="39" name="TextBox 38">
+            <a:extLst>
+              <a:ext uri="{FF2B5EF4-FFF2-40B4-BE49-F238E27FC236}">
+                <a16:creationId xmlns:a16="http://schemas.microsoft.com/office/drawing/2014/main" id="{D7FA99E0-8310-3444-8812-6E0D737881E4}"/>
+              </a:ext>
+            </a:extLst>
+          </p:cNvPr>
+          <p:cNvSpPr txBox="1"/>
+          <p:nvPr/>
+        </p:nvSpPr>
+        <p:spPr>
+          <a:xfrm>
+            <a:off x="9180059" y="3931062"/>
+            <a:ext cx="1345240" cy="369332"/>
+          </a:xfrm>
+          <a:prstGeom prst="rect">
+            <a:avLst/>
+          </a:prstGeom>
+          <a:noFill/>
+        </p:spPr>
+        <p:txBody>
+          <a:bodyPr wrap="none" rtlCol="0">
+            <a:spAutoFit/>
+          </a:bodyPr>
+          <a:lstStyle/>
+          <a:p>
+            <a:r>
+              <a:rPr lang="en-US" dirty="0"/>
+              <a:t>Name | </a:t>
+            </a:r>
+            <a:r>
+              <a:rPr lang="en-US" dirty="0" err="1"/>
+              <a:t>DoB</a:t>
+            </a:r>
+            <a:endParaRPr lang="en-US" dirty="0"/>
+          </a:p>
+        </p:txBody>
+      </p:sp>
+      <p:sp>
+        <p:nvSpPr>
+          <p:cNvPr id="40" name="TextBox 39">
+            <a:extLst>
+              <a:ext uri="{FF2B5EF4-FFF2-40B4-BE49-F238E27FC236}">
+                <a16:creationId xmlns:a16="http://schemas.microsoft.com/office/drawing/2014/main" id="{1BA8DE11-C3E0-3F49-86D6-1180750B86C0}"/>
+              </a:ext>
+            </a:extLst>
+          </p:cNvPr>
+          <p:cNvSpPr txBox="1"/>
+          <p:nvPr/>
+        </p:nvSpPr>
+        <p:spPr>
+          <a:xfrm>
+            <a:off x="9113925" y="5297525"/>
+            <a:ext cx="1888337" cy="646331"/>
+          </a:xfrm>
+          <a:prstGeom prst="rect">
+            <a:avLst/>
+          </a:prstGeom>
+          <a:noFill/>
+        </p:spPr>
+        <p:txBody>
+          <a:bodyPr wrap="none" rtlCol="0">
+            <a:spAutoFit/>
+          </a:bodyPr>
+          <a:lstStyle/>
+          <a:p>
+            <a:r>
+              <a:rPr lang="en-US" dirty="0"/>
+              <a:t>Personal Info</a:t>
+            </a:r>
+          </a:p>
+          <a:p>
+            <a:r>
+              <a:rPr lang="en-US" dirty="0"/>
+              <a:t>Flight Specific Info</a:t>
+            </a:r>
+          </a:p>
+        </p:txBody>
+      </p:sp>
+      <p:sp>
+        <p:nvSpPr>
+          <p:cNvPr id="38" name="Right Arrow 37">
+            <a:extLst>
+              <a:ext uri="{FF2B5EF4-FFF2-40B4-BE49-F238E27FC236}">
+                <a16:creationId xmlns:a16="http://schemas.microsoft.com/office/drawing/2014/main" id="{E83C8FF2-71C3-D64B-A8F2-769D6FB2AA16}"/>
+              </a:ext>
+            </a:extLst>
+          </p:cNvPr>
+          <p:cNvSpPr/>
+          <p:nvPr/>
+        </p:nvSpPr>
+        <p:spPr>
+          <a:xfrm>
+            <a:off x="5774527" y="1935555"/>
+            <a:ext cx="457273" cy="397600"/>
+          </a:xfrm>
+          <a:prstGeom prst="rightArrow">
+            <a:avLst/>
+          </a:prstGeom>
+          <a:solidFill>
+            <a:schemeClr val="bg1">
+              <a:lumMod val="85000"/>
+            </a:schemeClr>
+          </a:solidFill>
+          <a:ln>
+            <a:solidFill>
+              <a:schemeClr val="tx1">
+                <a:lumMod val="50000"/>
+                <a:lumOff val="50000"/>
+              </a:schemeClr>
+            </a:solidFill>
+          </a:ln>
+        </p:spPr>
+        <p:style>
+          <a:lnRef idx="2">
+            <a:schemeClr val="accent1">
+              <a:shade val="50000"/>
+            </a:schemeClr>
+          </a:lnRef>
+          <a:fillRef idx="1">
+            <a:schemeClr val="accent1"/>
+          </a:fillRef>
+          <a:effectRef idx="0">
+            <a:schemeClr val="accent1"/>
+          </a:effectRef>
+          <a:fontRef idx="minor">
+            <a:schemeClr val="lt1"/>
+          </a:fontRef>
+        </p:style>
+        <p:txBody>
+          <a:bodyPr rtlCol="0" anchor="ctr"/>
+          <a:lstStyle/>
+          <a:p>
+            <a:pPr algn="ctr"/>
+            <a:endParaRPr lang="en-US"/>
+          </a:p>
+        </p:txBody>
+      </p:sp>
+      <p:sp>
+        <p:nvSpPr>
+          <p:cNvPr id="42" name="Right Arrow 41">
+            <a:extLst>
+              <a:ext uri="{FF2B5EF4-FFF2-40B4-BE49-F238E27FC236}">
+                <a16:creationId xmlns:a16="http://schemas.microsoft.com/office/drawing/2014/main" id="{3DA28348-B0B0-A244-B2E8-97D84124DA41}"/>
+              </a:ext>
+            </a:extLst>
+          </p:cNvPr>
+          <p:cNvSpPr/>
+          <p:nvPr/>
+        </p:nvSpPr>
+        <p:spPr>
+          <a:xfrm>
+            <a:off x="5778085" y="3727764"/>
+            <a:ext cx="457273" cy="397600"/>
+          </a:xfrm>
+          <a:prstGeom prst="rightArrow">
+            <a:avLst/>
+          </a:prstGeom>
+          <a:solidFill>
+            <a:schemeClr val="bg1">
+              <a:lumMod val="85000"/>
+            </a:schemeClr>
+          </a:solidFill>
+          <a:ln>
+            <a:solidFill>
+              <a:schemeClr val="tx1">
+                <a:lumMod val="50000"/>
+                <a:lumOff val="50000"/>
+              </a:schemeClr>
+            </a:solidFill>
+          </a:ln>
+        </p:spPr>
+        <p:style>
+          <a:lnRef idx="2">
+            <a:schemeClr val="accent1">
+              <a:shade val="50000"/>
+            </a:schemeClr>
+          </a:lnRef>
+          <a:fillRef idx="1">
+            <a:schemeClr val="accent1"/>
+          </a:fillRef>
+          <a:effectRef idx="0">
+            <a:schemeClr val="accent1"/>
+          </a:effectRef>
+          <a:fontRef idx="minor">
+            <a:schemeClr val="lt1"/>
+          </a:fontRef>
+        </p:style>
+        <p:txBody>
+          <a:bodyPr rtlCol="0" anchor="ctr"/>
+          <a:lstStyle/>
+          <a:p>
+            <a:pPr algn="ctr"/>
+            <a:endParaRPr lang="en-US"/>
+          </a:p>
+        </p:txBody>
+      </p:sp>
+      <p:sp>
+        <p:nvSpPr>
+          <p:cNvPr id="43" name="Right Arrow 42">
+            <a:extLst>
+              <a:ext uri="{FF2B5EF4-FFF2-40B4-BE49-F238E27FC236}">
+                <a16:creationId xmlns:a16="http://schemas.microsoft.com/office/drawing/2014/main" id="{EBCAC1AF-80E6-3A43-AF77-D521C515D1F1}"/>
+              </a:ext>
+            </a:extLst>
+          </p:cNvPr>
+          <p:cNvSpPr/>
+          <p:nvPr/>
+        </p:nvSpPr>
+        <p:spPr>
+          <a:xfrm>
+            <a:off x="5809285" y="5430189"/>
+            <a:ext cx="457273" cy="397600"/>
+          </a:xfrm>
+          <a:prstGeom prst="rightArrow">
+            <a:avLst/>
+          </a:prstGeom>
+          <a:solidFill>
+            <a:schemeClr val="bg1">
+              <a:lumMod val="85000"/>
+            </a:schemeClr>
+          </a:solidFill>
+          <a:ln>
+            <a:solidFill>
+              <a:schemeClr val="tx1">
+                <a:lumMod val="50000"/>
+                <a:lumOff val="50000"/>
+              </a:schemeClr>
+            </a:solidFill>
+          </a:ln>
+        </p:spPr>
+        <p:style>
+          <a:lnRef idx="2">
+            <a:schemeClr val="accent1">
+              <a:shade val="50000"/>
+            </a:schemeClr>
+          </a:lnRef>
+          <a:fillRef idx="1">
+            <a:schemeClr val="accent1"/>
+          </a:fillRef>
+          <a:effectRef idx="0">
+            <a:schemeClr val="accent1"/>
+          </a:effectRef>
+          <a:fontRef idx="minor">
+            <a:schemeClr val="lt1"/>
+          </a:fontRef>
+        </p:style>
+        <p:txBody>
+          <a:bodyPr rtlCol="0" anchor="ctr"/>
+          <a:lstStyle/>
+          <a:p>
+            <a:pPr algn="ctr"/>
+            <a:endParaRPr lang="en-US"/>
+          </a:p>
+        </p:txBody>
+      </p:sp>
+      <p:sp>
+        <p:nvSpPr>
+          <p:cNvPr id="44" name="Right Arrow 43">
+            <a:extLst>
+              <a:ext uri="{FF2B5EF4-FFF2-40B4-BE49-F238E27FC236}">
+                <a16:creationId xmlns:a16="http://schemas.microsoft.com/office/drawing/2014/main" id="{13D26BA5-6709-4A46-9B9F-EE7ED30E23D0}"/>
+              </a:ext>
+            </a:extLst>
+          </p:cNvPr>
+          <p:cNvSpPr/>
+          <p:nvPr/>
+        </p:nvSpPr>
+        <p:spPr>
+          <a:xfrm>
+            <a:off x="8046519" y="1935550"/>
+            <a:ext cx="457273" cy="397600"/>
+          </a:xfrm>
+          <a:prstGeom prst="rightArrow">
+            <a:avLst/>
+          </a:prstGeom>
+          <a:solidFill>
+            <a:schemeClr val="bg1">
+              <a:lumMod val="85000"/>
+            </a:schemeClr>
+          </a:solidFill>
+          <a:ln>
+            <a:solidFill>
+              <a:schemeClr val="tx1">
+                <a:lumMod val="50000"/>
+                <a:lumOff val="50000"/>
+              </a:schemeClr>
+            </a:solidFill>
+          </a:ln>
+        </p:spPr>
+        <p:style>
+          <a:lnRef idx="2">
+            <a:schemeClr val="accent1">
+              <a:shade val="50000"/>
+            </a:schemeClr>
+          </a:lnRef>
+          <a:fillRef idx="1">
+            <a:schemeClr val="accent1"/>
+          </a:fillRef>
+          <a:effectRef idx="0">
+            <a:schemeClr val="accent1"/>
+          </a:effectRef>
+          <a:fontRef idx="minor">
+            <a:schemeClr val="lt1"/>
+          </a:fontRef>
+        </p:style>
+        <p:txBody>
+          <a:bodyPr rtlCol="0" anchor="ctr"/>
+          <a:lstStyle/>
+          <a:p>
+            <a:pPr algn="ctr"/>
+            <a:endParaRPr lang="en-US"/>
+          </a:p>
+        </p:txBody>
+      </p:sp>
+      <p:sp>
+        <p:nvSpPr>
+          <p:cNvPr id="45" name="Right Arrow 44">
+            <a:extLst>
+              <a:ext uri="{FF2B5EF4-FFF2-40B4-BE49-F238E27FC236}">
+                <a16:creationId xmlns:a16="http://schemas.microsoft.com/office/drawing/2014/main" id="{ABFC6851-7B07-D947-941D-101C0F7DF534}"/>
+              </a:ext>
+            </a:extLst>
+          </p:cNvPr>
+          <p:cNvSpPr/>
+          <p:nvPr/>
+        </p:nvSpPr>
+        <p:spPr>
+          <a:xfrm>
+            <a:off x="8279679" y="3679033"/>
+            <a:ext cx="457273" cy="397600"/>
+          </a:xfrm>
+          <a:prstGeom prst="rightArrow">
+            <a:avLst/>
+          </a:prstGeom>
+          <a:solidFill>
+            <a:schemeClr val="bg1">
+              <a:lumMod val="85000"/>
+            </a:schemeClr>
+          </a:solidFill>
+          <a:ln>
+            <a:solidFill>
+              <a:schemeClr val="tx1">
+                <a:lumMod val="50000"/>
+                <a:lumOff val="50000"/>
+              </a:schemeClr>
+            </a:solidFill>
+          </a:ln>
+        </p:spPr>
+        <p:style>
+          <a:lnRef idx="2">
+            <a:schemeClr val="accent1">
+              <a:shade val="50000"/>
+            </a:schemeClr>
+          </a:lnRef>
+          <a:fillRef idx="1">
+            <a:schemeClr val="accent1"/>
+          </a:fillRef>
+          <a:effectRef idx="0">
+            <a:schemeClr val="accent1"/>
+          </a:effectRef>
+          <a:fontRef idx="minor">
+            <a:schemeClr val="lt1"/>
+          </a:fontRef>
+        </p:style>
+        <p:txBody>
+          <a:bodyPr rtlCol="0" anchor="ctr"/>
+          <a:lstStyle/>
+          <a:p>
+            <a:pPr algn="ctr"/>
+            <a:endParaRPr lang="en-US"/>
+          </a:p>
+        </p:txBody>
+      </p:sp>
+      <p:sp>
+        <p:nvSpPr>
+          <p:cNvPr id="46" name="Right Arrow 45">
+            <a:extLst>
+              <a:ext uri="{FF2B5EF4-FFF2-40B4-BE49-F238E27FC236}">
+                <a16:creationId xmlns:a16="http://schemas.microsoft.com/office/drawing/2014/main" id="{7FAB9A92-D4F4-A74D-8A7A-0091F7D3FD03}"/>
+              </a:ext>
+            </a:extLst>
+          </p:cNvPr>
+          <p:cNvSpPr/>
+          <p:nvPr/>
+        </p:nvSpPr>
+        <p:spPr>
+          <a:xfrm>
+            <a:off x="8314047" y="5440727"/>
+            <a:ext cx="457273" cy="397600"/>
+          </a:xfrm>
+          <a:prstGeom prst="rightArrow">
+            <a:avLst/>
+          </a:prstGeom>
+          <a:solidFill>
+            <a:schemeClr val="bg1">
+              <a:lumMod val="85000"/>
+            </a:schemeClr>
+          </a:solidFill>
+          <a:ln>
+            <a:solidFill>
+              <a:schemeClr val="tx1">
+                <a:lumMod val="50000"/>
+                <a:lumOff val="50000"/>
+              </a:schemeClr>
+            </a:solidFill>
+          </a:ln>
+        </p:spPr>
+        <p:style>
+          <a:lnRef idx="2">
+            <a:schemeClr val="accent1">
+              <a:shade val="50000"/>
+            </a:schemeClr>
+          </a:lnRef>
+          <a:fillRef idx="1">
+            <a:schemeClr val="accent1"/>
+          </a:fillRef>
+          <a:effectRef idx="0">
+            <a:schemeClr val="accent1"/>
+          </a:effectRef>
+          <a:fontRef idx="minor">
+            <a:schemeClr val="lt1"/>
+          </a:fontRef>
+        </p:style>
+        <p:txBody>
+          <a:bodyPr rtlCol="0" anchor="ctr"/>
+          <a:lstStyle/>
+          <a:p>
+            <a:pPr algn="ctr"/>
+            <a:endParaRPr lang="en-US"/>
+          </a:p>
+        </p:txBody>
+      </p:sp>
+      <p:sp>
+        <p:nvSpPr>
+          <p:cNvPr id="41" name="TextBox 40">
+            <a:extLst>
+              <a:ext uri="{FF2B5EF4-FFF2-40B4-BE49-F238E27FC236}">
+                <a16:creationId xmlns:a16="http://schemas.microsoft.com/office/drawing/2014/main" id="{29033E15-A97F-5E42-8D3A-6808DBA074C0}"/>
+              </a:ext>
+            </a:extLst>
+          </p:cNvPr>
+          <p:cNvSpPr txBox="1"/>
+          <p:nvPr/>
+        </p:nvSpPr>
+        <p:spPr>
+          <a:xfrm>
             <a:off x="3030314" y="367865"/>
             <a:ext cx="6657720" cy="461665"/>
           </a:xfrm>
@@ -9115,7 +10846,7 @@
 </p:sld>
 </file>
 
-<file path=ppt/slides/slide5.xml><?xml version="1.0" encoding="utf-8"?>
+<file path=ppt/slides/slide6.xml><?xml version="1.0" encoding="utf-8"?>
 <p:sld xmlns:a="http://schemas.openxmlformats.org/drawingml/2006/main" xmlns:r="http://schemas.openxmlformats.org/officeDocument/2006/relationships" xmlns:p="http://schemas.openxmlformats.org/presentationml/2006/main">
   <p:cSld>
     <p:spTree>
@@ -10983,7 +12714,7 @@
 </p:sld>
 </file>
 
-<file path=ppt/slides/slide6.xml><?xml version="1.0" encoding="utf-8"?>
+<file path=ppt/slides/slide7.xml><?xml version="1.0" encoding="utf-8"?>
 <p:sld xmlns:a="http://schemas.openxmlformats.org/drawingml/2006/main" xmlns:r="http://schemas.openxmlformats.org/officeDocument/2006/relationships" xmlns:p="http://schemas.openxmlformats.org/presentationml/2006/main">
   <p:cSld>
     <p:spTree>
@@ -11527,6 +13258,212 @@
     <p:extLst>
       <p:ext uri="{BB962C8B-B14F-4D97-AF65-F5344CB8AC3E}">
         <p14:creationId xmlns:p14="http://schemas.microsoft.com/office/powerpoint/2010/main" val="646980692"/>
+      </p:ext>
+    </p:extLst>
+  </p:cSld>
+  <p:clrMapOvr>
+    <a:masterClrMapping/>
+  </p:clrMapOvr>
+</p:sld>
+</file>
+
+<file path=ppt/slides/slide8.xml><?xml version="1.0" encoding="utf-8"?>
+<p:sld xmlns:a="http://schemas.openxmlformats.org/drawingml/2006/main" xmlns:r="http://schemas.openxmlformats.org/officeDocument/2006/relationships" xmlns:p="http://schemas.openxmlformats.org/presentationml/2006/main">
+  <p:cSld>
+    <p:spTree>
+      <p:nvGrpSpPr>
+        <p:cNvPr id="1" name=""/>
+        <p:cNvGrpSpPr/>
+        <p:nvPr/>
+      </p:nvGrpSpPr>
+      <p:grpSpPr>
+        <a:xfrm>
+          <a:off x="0" y="0"/>
+          <a:ext cx="0" cy="0"/>
+          <a:chOff x="0" y="0"/>
+          <a:chExt cx="0" cy="0"/>
+        </a:xfrm>
+      </p:grpSpPr>
+      <p:pic>
+        <p:nvPicPr>
+          <p:cNvPr id="1026" name="Picture 2" descr="Wall Mount Kiosk">
+            <a:extLst>
+              <a:ext uri="{FF2B5EF4-FFF2-40B4-BE49-F238E27FC236}">
+                <a16:creationId xmlns:a16="http://schemas.microsoft.com/office/drawing/2014/main" id="{D7AD43EB-ABF5-5746-A557-7F1C6A557915}"/>
+              </a:ext>
+            </a:extLst>
+          </p:cNvPr>
+          <p:cNvPicPr>
+            <a:picLocks noChangeAspect="1" noChangeArrowheads="1"/>
+          </p:cNvPicPr>
+          <p:nvPr/>
+        </p:nvPicPr>
+        <p:blipFill>
+          <a:blip r:embed="rId2">
+            <a:extLst>
+              <a:ext uri="{28A0092B-C50C-407E-A947-70E740481C1C}">
+                <a14:useLocalDpi xmlns:a14="http://schemas.microsoft.com/office/drawing/2010/main" val="0"/>
+              </a:ext>
+            </a:extLst>
+          </a:blip>
+          <a:srcRect/>
+          <a:stretch>
+            <a:fillRect/>
+          </a:stretch>
+        </p:blipFill>
+        <p:spPr bwMode="auto">
+          <a:xfrm>
+            <a:off x="2667000" y="0"/>
+            <a:ext cx="6858000" cy="6858000"/>
+          </a:xfrm>
+          <a:prstGeom prst="rect">
+            <a:avLst/>
+          </a:prstGeom>
+          <a:noFill/>
+          <a:extLst>
+            <a:ext uri="{909E8E84-426E-40DD-AFC4-6F175D3DCCD1}">
+              <a14:hiddenFill xmlns:a14="http://schemas.microsoft.com/office/drawing/2010/main">
+                <a:solidFill>
+                  <a:srgbClr val="FFFFFF"/>
+                </a:solidFill>
+              </a14:hiddenFill>
+            </a:ext>
+          </a:extLst>
+        </p:spPr>
+      </p:pic>
+      <p:sp>
+        <p:nvSpPr>
+          <p:cNvPr id="2" name="TextBox 1">
+            <a:extLst>
+              <a:ext uri="{FF2B5EF4-FFF2-40B4-BE49-F238E27FC236}">
+                <a16:creationId xmlns:a16="http://schemas.microsoft.com/office/drawing/2014/main" id="{541B7F01-182B-6841-ADFD-41C6932993A5}"/>
+              </a:ext>
+            </a:extLst>
+          </p:cNvPr>
+          <p:cNvSpPr txBox="1"/>
+          <p:nvPr/>
+        </p:nvSpPr>
+        <p:spPr>
+          <a:xfrm>
+            <a:off x="4150659" y="1828800"/>
+            <a:ext cx="2593980" cy="369332"/>
+          </a:xfrm>
+          <a:prstGeom prst="rect">
+            <a:avLst/>
+          </a:prstGeom>
+          <a:noFill/>
+        </p:spPr>
+        <p:txBody>
+          <a:bodyPr wrap="none" rtlCol="0">
+            <a:spAutoFit/>
+          </a:bodyPr>
+          <a:lstStyle/>
+          <a:p>
+            <a:r>
+              <a:rPr lang="en-US" dirty="0">
+                <a:solidFill>
+                  <a:schemeClr val="bg1"/>
+                </a:solidFill>
+              </a:rPr>
+              <a:t>Dear Mr. Avkash Chauhan</a:t>
+            </a:r>
+          </a:p>
+        </p:txBody>
+      </p:sp>
+      <p:sp>
+        <p:nvSpPr>
+          <p:cNvPr id="3" name="TextBox 2">
+            <a:extLst>
+              <a:ext uri="{FF2B5EF4-FFF2-40B4-BE49-F238E27FC236}">
+                <a16:creationId xmlns:a16="http://schemas.microsoft.com/office/drawing/2014/main" id="{29396573-E99F-944D-BEEF-338696BE6B85}"/>
+              </a:ext>
+            </a:extLst>
+          </p:cNvPr>
+          <p:cNvSpPr txBox="1"/>
+          <p:nvPr/>
+        </p:nvSpPr>
+        <p:spPr>
+          <a:xfrm>
+            <a:off x="4150659" y="2198132"/>
+            <a:ext cx="3962400" cy="1754326"/>
+          </a:xfrm>
+          <a:prstGeom prst="rect">
+            <a:avLst/>
+          </a:prstGeom>
+          <a:noFill/>
+        </p:spPr>
+        <p:txBody>
+          <a:bodyPr wrap="square" rtlCol="0">
+            <a:spAutoFit/>
+          </a:bodyPr>
+          <a:lstStyle/>
+          <a:p>
+            <a:r>
+              <a:rPr lang="en-US" sz="1200" dirty="0">
+                <a:solidFill>
+                  <a:schemeClr val="bg1"/>
+                </a:solidFill>
+              </a:rPr>
+              <a:t>You are welcome to flight # A123 leaving at 4:30 PM from San Francisco to Chicago.</a:t>
+            </a:r>
+          </a:p>
+          <a:p>
+            <a:endParaRPr lang="en-US" sz="1200" dirty="0">
+              <a:solidFill>
+                <a:schemeClr val="bg1"/>
+              </a:solidFill>
+            </a:endParaRPr>
+          </a:p>
+          <a:p>
+            <a:r>
+              <a:rPr lang="en-US" sz="1200" dirty="0">
+                <a:solidFill>
+                  <a:schemeClr val="bg1"/>
+                </a:solidFill>
+              </a:rPr>
+              <a:t>Your seat number is A5, and it is confirmed.</a:t>
+            </a:r>
+          </a:p>
+          <a:p>
+            <a:endParaRPr lang="en-US" sz="1200" dirty="0">
+              <a:solidFill>
+                <a:schemeClr val="bg1"/>
+              </a:solidFill>
+            </a:endParaRPr>
+          </a:p>
+          <a:p>
+            <a:r>
+              <a:rPr lang="en-US" sz="1200" dirty="0">
+                <a:solidFill>
+                  <a:schemeClr val="bg1"/>
+                </a:solidFill>
+              </a:rPr>
+              <a:t>We have found a prohibited item into your carry-on baggage, and it is flagged for removed.</a:t>
+            </a:r>
+          </a:p>
+          <a:p>
+            <a:endParaRPr lang="en-US" sz="1200" dirty="0">
+              <a:solidFill>
+                <a:schemeClr val="bg1"/>
+              </a:solidFill>
+            </a:endParaRPr>
+          </a:p>
+          <a:p>
+            <a:r>
+              <a:rPr lang="en-US" sz="1200" dirty="0">
+                <a:solidFill>
+                  <a:schemeClr val="bg1"/>
+                </a:solidFill>
+              </a:rPr>
+              <a:t>Your identity is verified so please board to the plane. </a:t>
+            </a:r>
+          </a:p>
+        </p:txBody>
+      </p:sp>
+    </p:spTree>
+    <p:extLst>
+      <p:ext uri="{BB962C8B-B14F-4D97-AF65-F5344CB8AC3E}">
+        <p14:creationId xmlns:p14="http://schemas.microsoft.com/office/powerpoint/2010/main" val="3812928033"/>
       </p:ext>
     </p:extLst>
   </p:cSld>

</xml_diff>